<commit_message>
add sub function "logs"
</commit_message>
<xml_diff>
--- a/docs/AWS-ECS.pptx
+++ b/docs/AWS-ECS.pptx
@@ -257,7 +257,7 @@
           <a:p>
             <a:fld id="{73B234D0-82D7-4F59-9398-91BD09C6A5DD}" type="datetimeFigureOut">
               <a:rPr kumimoji="1" lang="ja-JP" altLang="en-US" smtClean="0"/>
-              <a:t>2018/4/2</a:t>
+              <a:t>2018/4/3</a:t>
             </a:fld>
             <a:endParaRPr kumimoji="1" lang="ja-JP" altLang="en-US"/>
           </a:p>
@@ -459,7 +459,7 @@
           <a:p>
             <a:fld id="{73B234D0-82D7-4F59-9398-91BD09C6A5DD}" type="datetimeFigureOut">
               <a:rPr kumimoji="1" lang="ja-JP" altLang="en-US" smtClean="0"/>
-              <a:t>2018/4/2</a:t>
+              <a:t>2018/4/3</a:t>
             </a:fld>
             <a:endParaRPr kumimoji="1" lang="ja-JP" altLang="en-US"/>
           </a:p>
@@ -671,7 +671,7 @@
           <a:p>
             <a:fld id="{73B234D0-82D7-4F59-9398-91BD09C6A5DD}" type="datetimeFigureOut">
               <a:rPr kumimoji="1" lang="ja-JP" altLang="en-US" smtClean="0"/>
-              <a:t>2018/4/2</a:t>
+              <a:t>2018/4/3</a:t>
             </a:fld>
             <a:endParaRPr kumimoji="1" lang="ja-JP" altLang="en-US"/>
           </a:p>
@@ -873,7 +873,7 @@
           <a:p>
             <a:fld id="{73B234D0-82D7-4F59-9398-91BD09C6A5DD}" type="datetimeFigureOut">
               <a:rPr kumimoji="1" lang="ja-JP" altLang="en-US" smtClean="0"/>
-              <a:t>2018/4/2</a:t>
+              <a:t>2018/4/3</a:t>
             </a:fld>
             <a:endParaRPr kumimoji="1" lang="ja-JP" altLang="en-US"/>
           </a:p>
@@ -1119,7 +1119,7 @@
           <a:p>
             <a:fld id="{73B234D0-82D7-4F59-9398-91BD09C6A5DD}" type="datetimeFigureOut">
               <a:rPr kumimoji="1" lang="ja-JP" altLang="en-US" smtClean="0"/>
-              <a:t>2018/4/2</a:t>
+              <a:t>2018/4/3</a:t>
             </a:fld>
             <a:endParaRPr kumimoji="1" lang="ja-JP" altLang="en-US"/>
           </a:p>
@@ -1415,7 +1415,7 @@
           <a:p>
             <a:fld id="{73B234D0-82D7-4F59-9398-91BD09C6A5DD}" type="datetimeFigureOut">
               <a:rPr kumimoji="1" lang="ja-JP" altLang="en-US" smtClean="0"/>
-              <a:t>2018/4/2</a:t>
+              <a:t>2018/4/3</a:t>
             </a:fld>
             <a:endParaRPr kumimoji="1" lang="ja-JP" altLang="en-US"/>
           </a:p>
@@ -1846,7 +1846,7 @@
           <a:p>
             <a:fld id="{73B234D0-82D7-4F59-9398-91BD09C6A5DD}" type="datetimeFigureOut">
               <a:rPr kumimoji="1" lang="ja-JP" altLang="en-US" smtClean="0"/>
-              <a:t>2018/4/2</a:t>
+              <a:t>2018/4/3</a:t>
             </a:fld>
             <a:endParaRPr kumimoji="1" lang="ja-JP" altLang="en-US"/>
           </a:p>
@@ -1964,7 +1964,7 @@
           <a:p>
             <a:fld id="{73B234D0-82D7-4F59-9398-91BD09C6A5DD}" type="datetimeFigureOut">
               <a:rPr kumimoji="1" lang="ja-JP" altLang="en-US" smtClean="0"/>
-              <a:t>2018/4/2</a:t>
+              <a:t>2018/4/3</a:t>
             </a:fld>
             <a:endParaRPr kumimoji="1" lang="ja-JP" altLang="en-US"/>
           </a:p>
@@ -2059,7 +2059,7 @@
           <a:p>
             <a:fld id="{73B234D0-82D7-4F59-9398-91BD09C6A5DD}" type="datetimeFigureOut">
               <a:rPr kumimoji="1" lang="ja-JP" altLang="en-US" smtClean="0"/>
-              <a:t>2018/4/2</a:t>
+              <a:t>2018/4/3</a:t>
             </a:fld>
             <a:endParaRPr kumimoji="1" lang="ja-JP" altLang="en-US"/>
           </a:p>
@@ -2368,7 +2368,7 @@
           <a:p>
             <a:fld id="{73B234D0-82D7-4F59-9398-91BD09C6A5DD}" type="datetimeFigureOut">
               <a:rPr kumimoji="1" lang="ja-JP" altLang="en-US" smtClean="0"/>
-              <a:t>2018/4/2</a:t>
+              <a:t>2018/4/3</a:t>
             </a:fld>
             <a:endParaRPr kumimoji="1" lang="ja-JP" altLang="en-US"/>
           </a:p>
@@ -2625,7 +2625,7 @@
           <a:p>
             <a:fld id="{73B234D0-82D7-4F59-9398-91BD09C6A5DD}" type="datetimeFigureOut">
               <a:rPr kumimoji="1" lang="ja-JP" altLang="en-US" smtClean="0"/>
-              <a:t>2018/4/2</a:t>
+              <a:t>2018/4/3</a:t>
             </a:fld>
             <a:endParaRPr kumimoji="1" lang="ja-JP" altLang="en-US"/>
           </a:p>
@@ -2870,7 +2870,7 @@
           <a:p>
             <a:fld id="{73B234D0-82D7-4F59-9398-91BD09C6A5DD}" type="datetimeFigureOut">
               <a:rPr kumimoji="1" lang="ja-JP" altLang="en-US" smtClean="0"/>
-              <a:t>2018/4/2</a:t>
+              <a:t>2018/4/3</a:t>
             </a:fld>
             <a:endParaRPr kumimoji="1" lang="ja-JP" altLang="en-US"/>
           </a:p>
@@ -4864,7 +4864,15 @@
           <a:p>
             <a:r>
               <a:rPr kumimoji="1" lang="en-US" altLang="ja-JP" smtClean="0"/>
-              <a:t>ecsub data flow 6 - copy output file to s3</a:t>
+              <a:t>ecsub data flow 6 - copy </a:t>
+            </a:r>
+            <a:r>
+              <a:rPr kumimoji="1" lang="en-US" altLang="ja-JP" smtClean="0"/>
+              <a:t>output-file </a:t>
+            </a:r>
+            <a:r>
+              <a:rPr kumimoji="1" lang="en-US" altLang="ja-JP" smtClean="0"/>
+              <a:t>to s3</a:t>
             </a:r>
             <a:endParaRPr kumimoji="1" lang="ja-JP" altLang="en-US"/>
           </a:p>
@@ -7436,15 +7444,7 @@
           <a:p>
             <a:r>
               <a:rPr kumimoji="1" lang="en-US" altLang="ja-JP" smtClean="0"/>
-              <a:t>ecsub </a:t>
-            </a:r>
-            <a:r>
-              <a:rPr kumimoji="1" lang="en-US" altLang="ja-JP" smtClean="0"/>
-              <a:t>tasks.tsv </a:t>
-            </a:r>
-            <a:r>
-              <a:rPr kumimoji="1" lang="en-US" altLang="ja-JP" smtClean="0"/>
-              <a:t>format</a:t>
+              <a:t>ecsub tasks.tsv format</a:t>
             </a:r>
             <a:endParaRPr kumimoji="1" lang="ja-JP" altLang="en-US"/>
           </a:p>
@@ -7560,7 +7560,15 @@
             <a:pPr lvl="1"/>
             <a:r>
               <a:rPr lang="en-US" altLang="ja-JP" smtClean="0"/>
-              <a:t>--input [NAME]  set s3 file-path, copy s3 to container.</a:t>
+              <a:t>--input [NAME]  set s3 file-path, copy s3 </a:t>
+            </a:r>
+            <a:r>
+              <a:rPr lang="en-US" altLang="ja-JP" smtClean="0"/>
+              <a:t>-&gt; </a:t>
+            </a:r>
+            <a:r>
+              <a:rPr lang="en-US" altLang="ja-JP" smtClean="0"/>
+              <a:t>container.</a:t>
             </a:r>
           </a:p>
           <a:p>
@@ -7583,12 +7591,21 @@
             </a:r>
             <a:r>
               <a:rPr lang="en-US" altLang="ja-JP"/>
-              <a:t>, copy s3 to </a:t>
+              <a:t>, copy </a:t>
             </a:r>
             <a:r>
               <a:rPr lang="en-US" altLang="ja-JP" smtClean="0"/>
-              <a:t>container recursive.</a:t>
-            </a:r>
+              <a:t>with </a:t>
+            </a:r>
+            <a:r>
+              <a:rPr lang="en-US" altLang="ja-JP" smtClean="0"/>
+              <a:t>recursive s3 </a:t>
+            </a:r>
+            <a:r>
+              <a:rPr lang="en-US" altLang="ja-JP"/>
+              <a:t>-&gt; container.</a:t>
+            </a:r>
+            <a:endParaRPr lang="en-US" altLang="ja-JP" smtClean="0"/>
           </a:p>
           <a:p>
             <a:pPr lvl="1"/>
@@ -7602,7 +7619,15 @@
             </a:r>
             <a:r>
               <a:rPr lang="en-US" altLang="ja-JP" smtClean="0"/>
-              <a:t>container to s3.</a:t>
+              <a:t>container </a:t>
+            </a:r>
+            <a:r>
+              <a:rPr lang="en-US" altLang="ja-JP" smtClean="0"/>
+              <a:t>-&gt; </a:t>
+            </a:r>
+            <a:r>
+              <a:rPr lang="en-US" altLang="ja-JP" smtClean="0"/>
+              <a:t>s3.</a:t>
             </a:r>
             <a:endParaRPr kumimoji="1" lang="en-US" altLang="ja-JP" smtClean="0"/>
           </a:p>
@@ -7618,11 +7643,15 @@
             </a:r>
             <a:r>
               <a:rPr lang="en-US" altLang="ja-JP" smtClean="0"/>
-              <a:t>container to s3 recursive</a:t>
+              <a:t>with </a:t>
+            </a:r>
+            <a:r>
+              <a:rPr lang="en-US" altLang="ja-JP" smtClean="0"/>
+              <a:t>recursive container </a:t>
             </a:r>
             <a:r>
               <a:rPr lang="en-US" altLang="ja-JP"/>
-              <a:t>.</a:t>
+              <a:t>-&gt; s3.</a:t>
             </a:r>
             <a:endParaRPr lang="ja-JP" altLang="en-US"/>
           </a:p>
@@ -10192,8 +10221,21 @@
                   <a:schemeClr val="accent5"/>
                 </a:solidFill>
               </a:rPr>
-              <a:t>aws s3 cp $ENV ./env.sh</a:t>
-            </a:r>
+              <a:t>aws s3 cp $ENV </a:t>
+            </a:r>
+            <a:r>
+              <a:rPr kumimoji="1" lang="en-US" altLang="ja-JP">
+                <a:solidFill>
+                  <a:schemeClr val="accent5"/>
+                </a:solidFill>
+              </a:rPr>
+              <a:t>./setenv.0.sh</a:t>
+            </a:r>
+            <a:endParaRPr kumimoji="1" lang="en-US" altLang="ja-JP">
+              <a:solidFill>
+                <a:schemeClr val="accent5"/>
+              </a:solidFill>
+            </a:endParaRPr>
           </a:p>
           <a:p>
             <a:r>
@@ -10202,8 +10244,21 @@
                   <a:schemeClr val="accent2"/>
                 </a:solidFill>
               </a:rPr>
-              <a:t>aws s3 cp $EXEC ./exec.sh</a:t>
-            </a:r>
+              <a:t>aws s3 cp $EXEC </a:t>
+            </a:r>
+            <a:r>
+              <a:rPr kumimoji="1" lang="en-US" altLang="ja-JP" smtClean="0">
+                <a:solidFill>
+                  <a:schemeClr val="accent2"/>
+                </a:solidFill>
+              </a:rPr>
+              <a:t>./run-wordcount.sh</a:t>
+            </a:r>
+            <a:endParaRPr kumimoji="1" lang="en-US" altLang="ja-JP">
+              <a:solidFill>
+                <a:schemeClr val="accent2"/>
+              </a:solidFill>
+            </a:endParaRPr>
           </a:p>
           <a:p>
             <a:r>
@@ -10212,8 +10267,21 @@
                   <a:schemeClr val="accent5"/>
                 </a:solidFill>
               </a:rPr>
-              <a:t>source ./env.sh</a:t>
-            </a:r>
+              <a:t>source </a:t>
+            </a:r>
+            <a:r>
+              <a:rPr kumimoji="1" lang="en-US" altLang="ja-JP" b="1" smtClean="0">
+                <a:solidFill>
+                  <a:schemeClr val="accent5"/>
+                </a:solidFill>
+              </a:rPr>
+              <a:t>./setenv.0.sh</a:t>
+            </a:r>
+            <a:endParaRPr kumimoji="1" lang="en-US" altLang="ja-JP" b="1">
+              <a:solidFill>
+                <a:schemeClr val="accent5"/>
+              </a:solidFill>
+            </a:endParaRPr>
           </a:p>
           <a:p>
             <a:r>
@@ -10263,8 +10331,13 @@
                   <a:schemeClr val="accent2"/>
                 </a:solidFill>
               </a:rPr>
-              <a:t>./exec.sh</a:t>
-            </a:r>
+              <a:t>./run-wordcount.sh</a:t>
+            </a:r>
+            <a:endParaRPr kumimoji="1" lang="en-US" altLang="ja-JP" b="1">
+              <a:solidFill>
+                <a:schemeClr val="accent2"/>
+              </a:solidFill>
+            </a:endParaRPr>
           </a:p>
           <a:p>
             <a:r>

</xml_diff>